<commit_message>
Adicionado o Mini Ícone
</commit_message>
<xml_diff>
--- a/documentação/logo.pptx
+++ b/documentação/logo.pptx
@@ -104,6 +104,11 @@
       </a:defRPr>
     </a:lvl9pPr>
   </p:defaultTextStyle>
+  <p:extLst>
+    <p:ext uri="{EFAFB233-063F-42B5-8137-9DF3F51BA10A}">
+      <p15:sldGuideLst xmlns:p15="http://schemas.microsoft.com/office/powerpoint/2012/main"/>
+    </p:ext>
+  </p:extLst>
 </p:presentation>
 </file>
 
@@ -254,7 +259,7 @@
           <a:p>
             <a:fld id="{C38F6520-7D33-45D8-9712-50F8A47CB181}" type="datetimeFigureOut">
               <a:rPr lang="pt-BR" smtClean="0"/>
-              <a:t>07/06/2021</a:t>
+              <a:t>21/06/2021</a:t>
             </a:fld>
             <a:endParaRPr lang="pt-BR"/>
           </a:p>
@@ -452,7 +457,7 @@
           <a:p>
             <a:fld id="{C38F6520-7D33-45D8-9712-50F8A47CB181}" type="datetimeFigureOut">
               <a:rPr lang="pt-BR" smtClean="0"/>
-              <a:t>07/06/2021</a:t>
+              <a:t>21/06/2021</a:t>
             </a:fld>
             <a:endParaRPr lang="pt-BR"/>
           </a:p>
@@ -660,7 +665,7 @@
           <a:p>
             <a:fld id="{C38F6520-7D33-45D8-9712-50F8A47CB181}" type="datetimeFigureOut">
               <a:rPr lang="pt-BR" smtClean="0"/>
-              <a:t>07/06/2021</a:t>
+              <a:t>21/06/2021</a:t>
             </a:fld>
             <a:endParaRPr lang="pt-BR"/>
           </a:p>
@@ -858,7 +863,7 @@
           <a:p>
             <a:fld id="{C38F6520-7D33-45D8-9712-50F8A47CB181}" type="datetimeFigureOut">
               <a:rPr lang="pt-BR" smtClean="0"/>
-              <a:t>07/06/2021</a:t>
+              <a:t>21/06/2021</a:t>
             </a:fld>
             <a:endParaRPr lang="pt-BR"/>
           </a:p>
@@ -1133,7 +1138,7 @@
           <a:p>
             <a:fld id="{C38F6520-7D33-45D8-9712-50F8A47CB181}" type="datetimeFigureOut">
               <a:rPr lang="pt-BR" smtClean="0"/>
-              <a:t>07/06/2021</a:t>
+              <a:t>21/06/2021</a:t>
             </a:fld>
             <a:endParaRPr lang="pt-BR"/>
           </a:p>
@@ -1398,7 +1403,7 @@
           <a:p>
             <a:fld id="{C38F6520-7D33-45D8-9712-50F8A47CB181}" type="datetimeFigureOut">
               <a:rPr lang="pt-BR" smtClean="0"/>
-              <a:t>07/06/2021</a:t>
+              <a:t>21/06/2021</a:t>
             </a:fld>
             <a:endParaRPr lang="pt-BR"/>
           </a:p>
@@ -1810,7 +1815,7 @@
           <a:p>
             <a:fld id="{C38F6520-7D33-45D8-9712-50F8A47CB181}" type="datetimeFigureOut">
               <a:rPr lang="pt-BR" smtClean="0"/>
-              <a:t>07/06/2021</a:t>
+              <a:t>21/06/2021</a:t>
             </a:fld>
             <a:endParaRPr lang="pt-BR"/>
           </a:p>
@@ -1951,7 +1956,7 @@
           <a:p>
             <a:fld id="{C38F6520-7D33-45D8-9712-50F8A47CB181}" type="datetimeFigureOut">
               <a:rPr lang="pt-BR" smtClean="0"/>
-              <a:t>07/06/2021</a:t>
+              <a:t>21/06/2021</a:t>
             </a:fld>
             <a:endParaRPr lang="pt-BR"/>
           </a:p>
@@ -2064,7 +2069,7 @@
           <a:p>
             <a:fld id="{C38F6520-7D33-45D8-9712-50F8A47CB181}" type="datetimeFigureOut">
               <a:rPr lang="pt-BR" smtClean="0"/>
-              <a:t>07/06/2021</a:t>
+              <a:t>21/06/2021</a:t>
             </a:fld>
             <a:endParaRPr lang="pt-BR"/>
           </a:p>
@@ -2375,7 +2380,7 @@
           <a:p>
             <a:fld id="{C38F6520-7D33-45D8-9712-50F8A47CB181}" type="datetimeFigureOut">
               <a:rPr lang="pt-BR" smtClean="0"/>
-              <a:t>07/06/2021</a:t>
+              <a:t>21/06/2021</a:t>
             </a:fld>
             <a:endParaRPr lang="pt-BR"/>
           </a:p>
@@ -2663,7 +2668,7 @@
           <a:p>
             <a:fld id="{C38F6520-7D33-45D8-9712-50F8A47CB181}" type="datetimeFigureOut">
               <a:rPr lang="pt-BR" smtClean="0"/>
-              <a:t>07/06/2021</a:t>
+              <a:t>21/06/2021</a:t>
             </a:fld>
             <a:endParaRPr lang="pt-BR"/>
           </a:p>
@@ -2904,7 +2909,7 @@
           <a:p>
             <a:fld id="{C38F6520-7D33-45D8-9712-50F8A47CB181}" type="datetimeFigureOut">
               <a:rPr lang="pt-BR" smtClean="0"/>
-              <a:t>07/06/2021</a:t>
+              <a:t>21/06/2021</a:t>
             </a:fld>
             <a:endParaRPr lang="pt-BR"/>
           </a:p>
@@ -3619,6 +3624,189 @@
           </a:prstGeom>
         </p:spPr>
       </p:pic>
+      <p:sp>
+        <p:nvSpPr>
+          <p:cNvPr id="9" name="Retângulo 8">
+            <a:extLst>
+              <a:ext uri="{FF2B5EF4-FFF2-40B4-BE49-F238E27FC236}">
+                <a16:creationId xmlns:a16="http://schemas.microsoft.com/office/drawing/2014/main" id="{258AC5E3-2D85-425F-973B-EBDA800E3CD8}"/>
+              </a:ext>
+            </a:extLst>
+          </p:cNvPr>
+          <p:cNvSpPr/>
+          <p:nvPr/>
+        </p:nvSpPr>
+        <p:spPr>
+          <a:xfrm>
+            <a:off x="1409700" y="3752795"/>
+            <a:ext cx="450850" cy="219075"/>
+          </a:xfrm>
+          <a:prstGeom prst="rect">
+            <a:avLst/>
+          </a:prstGeom>
+          <a:solidFill>
+            <a:srgbClr val="082237"/>
+          </a:solidFill>
+          <a:ln>
+            <a:solidFill>
+              <a:srgbClr val="082237"/>
+            </a:solidFill>
+          </a:ln>
+        </p:spPr>
+        <p:style>
+          <a:lnRef idx="2">
+            <a:schemeClr val="accent1">
+              <a:shade val="50000"/>
+            </a:schemeClr>
+          </a:lnRef>
+          <a:fillRef idx="1">
+            <a:schemeClr val="accent1"/>
+          </a:fillRef>
+          <a:effectRef idx="0">
+            <a:schemeClr val="accent1"/>
+          </a:effectRef>
+          <a:fontRef idx="minor">
+            <a:schemeClr val="lt1"/>
+          </a:fontRef>
+        </p:style>
+        <p:txBody>
+          <a:bodyPr rtlCol="0" anchor="t"/>
+          <a:lstStyle/>
+          <a:p>
+            <a:pPr algn="ctr"/>
+            <a:endParaRPr lang="pt-BR" sz="1050" dirty="0">
+              <a:solidFill>
+                <a:srgbClr val="FF0000"/>
+              </a:solidFill>
+            </a:endParaRPr>
+          </a:p>
+        </p:txBody>
+      </p:sp>
+      <p:grpSp>
+        <p:nvGrpSpPr>
+          <p:cNvPr id="3" name="Agrupar 2">
+            <a:extLst>
+              <a:ext uri="{FF2B5EF4-FFF2-40B4-BE49-F238E27FC236}">
+                <a16:creationId xmlns:a16="http://schemas.microsoft.com/office/drawing/2014/main" id="{8BF3F10F-BEBE-4DCD-8BE8-C686964E564A}"/>
+              </a:ext>
+            </a:extLst>
+          </p:cNvPr>
+          <p:cNvGrpSpPr/>
+          <p:nvPr/>
+        </p:nvGrpSpPr>
+        <p:grpSpPr>
+          <a:xfrm>
+            <a:off x="2555205" y="2886131"/>
+            <a:ext cx="542869" cy="542869"/>
+            <a:chOff x="2752725" y="2886131"/>
+            <a:chExt cx="542869" cy="542869"/>
+          </a:xfrm>
+        </p:grpSpPr>
+        <p:sp>
+          <p:nvSpPr>
+            <p:cNvPr id="2" name="Retângulo 1">
+              <a:extLst>
+                <a:ext uri="{FF2B5EF4-FFF2-40B4-BE49-F238E27FC236}">
+                  <a16:creationId xmlns:a16="http://schemas.microsoft.com/office/drawing/2014/main" id="{3C858F9F-99EB-4557-A126-031816F3DF62}"/>
+                </a:ext>
+              </a:extLst>
+            </p:cNvPr>
+            <p:cNvSpPr/>
+            <p:nvPr/>
+          </p:nvSpPr>
+          <p:spPr>
+            <a:xfrm>
+              <a:off x="2752725" y="2886131"/>
+              <a:ext cx="542869" cy="542869"/>
+            </a:xfrm>
+            <a:prstGeom prst="rect">
+              <a:avLst/>
+            </a:prstGeom>
+            <a:solidFill>
+              <a:srgbClr val="082237"/>
+            </a:solidFill>
+            <a:ln>
+              <a:noFill/>
+            </a:ln>
+          </p:spPr>
+          <p:style>
+            <a:lnRef idx="2">
+              <a:schemeClr val="accent1">
+                <a:shade val="50000"/>
+              </a:schemeClr>
+            </a:lnRef>
+            <a:fillRef idx="1">
+              <a:schemeClr val="accent1"/>
+            </a:fillRef>
+            <a:effectRef idx="0">
+              <a:schemeClr val="accent1"/>
+            </a:effectRef>
+            <a:fontRef idx="minor">
+              <a:schemeClr val="lt1"/>
+            </a:fontRef>
+          </p:style>
+          <p:txBody>
+            <a:bodyPr rtlCol="0" anchor="ctr"/>
+            <a:lstStyle/>
+            <a:p>
+              <a:pPr algn="ctr"/>
+              <a:endParaRPr lang="pt-BR"/>
+            </a:p>
+          </p:txBody>
+        </p:sp>
+        <p:sp>
+          <p:nvSpPr>
+            <p:cNvPr id="10" name="CaixaDeTexto 9">
+              <a:extLst>
+                <a:ext uri="{FF2B5EF4-FFF2-40B4-BE49-F238E27FC236}">
+                  <a16:creationId xmlns:a16="http://schemas.microsoft.com/office/drawing/2014/main" id="{1EDB234E-A251-4240-8599-D6945A8EB1A8}"/>
+                </a:ext>
+              </a:extLst>
+            </p:cNvPr>
+            <p:cNvSpPr txBox="1"/>
+            <p:nvPr/>
+          </p:nvSpPr>
+          <p:spPr>
+            <a:xfrm>
+              <a:off x="2781299" y="3034454"/>
+              <a:ext cx="476251" cy="246221"/>
+            </a:xfrm>
+            <a:prstGeom prst="rect">
+              <a:avLst/>
+            </a:prstGeom>
+            <a:noFill/>
+          </p:spPr>
+          <p:txBody>
+            <a:bodyPr wrap="square" rtlCol="0" anchor="ctr">
+              <a:spAutoFit/>
+            </a:bodyPr>
+            <a:lstStyle/>
+            <a:p>
+              <a:pPr algn="ctr"/>
+              <a:r>
+                <a:rPr lang="pt-BR" sz="1000" dirty="0">
+                  <a:solidFill>
+                    <a:srgbClr val="DF1C24"/>
+                  </a:solidFill>
+                  <a:latin typeface="Arial Rounded MT Bold" panose="020F0704030504030204" pitchFamily="34" charset="0"/>
+                  <a:cs typeface="Arial" panose="020B0604020202020204" pitchFamily="34" charset="0"/>
+                </a:rPr>
+                <a:t>#F</a:t>
+              </a:r>
+              <a:r>
+                <a:rPr lang="pt-BR" sz="1000" dirty="0">
+                  <a:solidFill>
+                    <a:schemeClr val="bg1"/>
+                  </a:solidFill>
+                  <a:latin typeface="Harlow Solid Italic" panose="04030604020F02020D02" pitchFamily="82" charset="0"/>
+                  <a:cs typeface="Arial" panose="020B0604020202020204" pitchFamily="34" charset="0"/>
+                </a:rPr>
+                <a:t>M</a:t>
+              </a:r>
+            </a:p>
+          </p:txBody>
+        </p:sp>
+      </p:grpSp>
     </p:spTree>
     <p:extLst>
       <p:ext uri="{BB962C8B-B14F-4D97-AF65-F5344CB8AC3E}">

</xml_diff>